<commit_message>
finished first draft of Module 03
</commit_message>
<xml_diff>
--- a/Slides/Lesson 1.4 Using a Template.pptx
+++ b/Slides/Lesson 1.4 Using a Template.pptx
@@ -5,7 +5,7 @@
     <p:sldMasterId id="2147483648" r:id="rId1"/>
   </p:sldMasterIdLst>
   <p:notesMasterIdLst>
-    <p:notesMasterId r:id="rId25"/>
+    <p:notesMasterId r:id="rId24"/>
   </p:notesMasterIdLst>
   <p:sldIdLst>
     <p:sldId id="276" r:id="rId2"/>
@@ -29,13 +29,12 @@
     <p:sldId id="328" r:id="rId20"/>
     <p:sldId id="329" r:id="rId21"/>
     <p:sldId id="348" r:id="rId22"/>
-    <p:sldId id="347" r:id="rId23"/>
-    <p:sldId id="327" r:id="rId24"/>
+    <p:sldId id="327" r:id="rId23"/>
   </p:sldIdLst>
   <p:sldSz cx="9144000" cy="6858000" type="screen4x3"/>
   <p:notesSz cx="6858000" cy="9144000"/>
   <p:custDataLst>
-    <p:tags r:id="rId26"/>
+    <p:tags r:id="rId25"/>
   </p:custDataLst>
   <p:defaultTextStyle>
     <a:defPPr>
@@ -158,7 +157,6 @@
             <p14:sldId id="328"/>
             <p14:sldId id="329"/>
             <p14:sldId id="348"/>
-            <p14:sldId id="347"/>
             <p14:sldId id="327"/>
           </p14:sldIdLst>
         </p14:section>
@@ -4134,7 +4132,7 @@
             <a:fld id="{0FAC78B3-EDCE-4187-A1AE-28620314FA32}" type="datetimeFigureOut">
               <a:rPr lang="en-US" smtClean="0"/>
               <a:pPr/>
-              <a:t>7/25/2017</a:t>
+              <a:t>8/2/2017</a:t>
             </a:fld>
             <a:endParaRPr lang="en-US"/>
           </a:p>
@@ -4693,7 +4691,7 @@
           <a:p>
             <a:fld id="{AE36E179-9677-406E-90D9-3402BE92068A}" type="datetime1">
               <a:rPr lang="en-US" smtClean="0"/>
-              <a:t>7/25/2017</a:t>
+              <a:t>8/2/2017</a:t>
             </a:fld>
             <a:endParaRPr lang="en-US"/>
           </a:p>
@@ -4957,7 +4955,7 @@
           <a:p>
             <a:fld id="{9C106CB1-CEAE-4FA9-AC65-2E4B01C62B73}" type="datetime1">
               <a:rPr lang="en-US" smtClean="0"/>
-              <a:t>7/25/2017</a:t>
+              <a:t>8/2/2017</a:t>
             </a:fld>
             <a:endParaRPr lang="en-US"/>
           </a:p>
@@ -5137,7 +5135,7 @@
           <a:p>
             <a:fld id="{2D3DB8E0-41F1-4047-A2BB-3AF23AEFB7A8}" type="datetime1">
               <a:rPr lang="en-US" smtClean="0"/>
-              <a:t>7/25/2017</a:t>
+              <a:t>8/2/2017</a:t>
             </a:fld>
             <a:endParaRPr lang="en-US"/>
           </a:p>
@@ -5327,7 +5325,7 @@
           <a:p>
             <a:fld id="{2EDFADFF-E434-421D-BD26-7C347DAB516F}" type="datetime1">
               <a:rPr lang="en-US" smtClean="0"/>
-              <a:t>7/25/2017</a:t>
+              <a:t>8/2/2017</a:t>
             </a:fld>
             <a:endParaRPr lang="en-US"/>
           </a:p>
@@ -5519,7 +5517,7 @@
           <a:p>
             <a:fld id="{3B722677-7067-4D71-BF6A-8259C5E94357}" type="datetime1">
               <a:rPr lang="en-US" smtClean="0"/>
-              <a:t>7/25/2017</a:t>
+              <a:t>8/2/2017</a:t>
             </a:fld>
             <a:endParaRPr lang="en-US"/>
           </a:p>
@@ -5926,7 +5924,7 @@
           <a:p>
             <a:fld id="{0C6FD516-C588-49F9-8A09-31EF43101ACE}" type="datetime1">
               <a:rPr lang="en-US" smtClean="0"/>
-              <a:t>7/25/2017</a:t>
+              <a:t>8/2/2017</a:t>
             </a:fld>
             <a:endParaRPr lang="en-US"/>
           </a:p>
@@ -6223,7 +6221,7 @@
           <a:p>
             <a:fld id="{62847054-0C3A-4855-B827-AB022CCDB352}" type="datetime1">
               <a:rPr lang="en-US" smtClean="0"/>
-              <a:t>7/25/2017</a:t>
+              <a:t>8/2/2017</a:t>
             </a:fld>
             <a:endParaRPr lang="en-US"/>
           </a:p>
@@ -6654,7 +6652,7 @@
           <a:p>
             <a:fld id="{787C7470-D2BA-4210-A881-18C149229110}" type="datetime1">
               <a:rPr lang="en-US" smtClean="0"/>
-              <a:t>7/25/2017</a:t>
+              <a:t>8/2/2017</a:t>
             </a:fld>
             <a:endParaRPr lang="en-US"/>
           </a:p>
@@ -6783,7 +6781,7 @@
           <a:p>
             <a:fld id="{8DEC73FD-A5ED-479F-9068-BAD5EB3F7E69}" type="datetime1">
               <a:rPr lang="en-US" smtClean="0"/>
-              <a:t>7/25/2017</a:t>
+              <a:t>8/2/2017</a:t>
             </a:fld>
             <a:endParaRPr lang="en-US"/>
           </a:p>
@@ -6890,7 +6888,7 @@
           <a:p>
             <a:fld id="{EA1BC252-941B-4451-B02D-F879104EB58F}" type="datetime1">
               <a:rPr lang="en-US" smtClean="0"/>
-              <a:t>7/25/2017</a:t>
+              <a:t>8/2/2017</a:t>
             </a:fld>
             <a:endParaRPr lang="en-US"/>
           </a:p>
@@ -7177,7 +7175,7 @@
           <a:p>
             <a:fld id="{43A8641F-9EDF-4983-849A-96C94386CBBC}" type="datetime1">
               <a:rPr lang="en-US" smtClean="0"/>
-              <a:t>7/25/2017</a:t>
+              <a:t>8/2/2017</a:t>
             </a:fld>
             <a:endParaRPr lang="en-US"/>
           </a:p>
@@ -10615,14 +10613,12 @@
         </p:nvSpPr>
         <p:spPr/>
         <p:txBody>
-          <a:bodyPr>
-            <a:normAutofit fontScale="90000"/>
-          </a:bodyPr>
+          <a:bodyPr/>
           <a:lstStyle/>
           <a:p>
             <a:r>
               <a:rPr lang="en-US" dirty="0"/>
-              <a:t>Remember: the shape of the program follows the shape of the data</a:t>
+              <a:t>Next Steps</a:t>
             </a:r>
           </a:p>
         </p:txBody>
@@ -10642,7 +10638,43 @@
           <a:bodyPr/>
           <a:lstStyle/>
           <a:p>
-            <a:endParaRPr lang="en-US"/>
+            <a:r>
+              <a:rPr lang="en-US" dirty="0"/>
+              <a:t>Study 01-4-1-book-receipts.rkt and 01-4-2-traffic-light.rkt in the Examples folder.</a:t>
+            </a:r>
+          </a:p>
+          <a:p>
+            <a:pPr lvl="1"/>
+            <a:r>
+              <a:rPr lang="en-US" dirty="0"/>
+              <a:t>Be sure to finish the </a:t>
+            </a:r>
+            <a:r>
+              <a:rPr lang="en-US" b="1" dirty="0"/>
+              <a:t>previous-state</a:t>
+            </a:r>
+            <a:r>
+              <a:rPr lang="en-US" dirty="0"/>
+              <a:t> example in 01-4-2-traffic-light.rkt</a:t>
+            </a:r>
+          </a:p>
+          <a:p>
+            <a:r>
+              <a:rPr lang="en-US" dirty="0"/>
+              <a:t>If you have questions or comments about this lesson, post them on the discussion board.</a:t>
+            </a:r>
+          </a:p>
+          <a:p>
+            <a:r>
+              <a:rPr lang="en-US" dirty="0"/>
+              <a:t>Do the Guided Practices</a:t>
+            </a:r>
+          </a:p>
+          <a:p>
+            <a:r>
+              <a:rPr lang="en-US" dirty="0"/>
+              <a:t>Go on to the next lesson.</a:t>
+            </a:r>
           </a:p>
         </p:txBody>
       </p:sp>
@@ -10665,137 +10697,6 @@
               <a:rPr lang="en-US" smtClean="0"/>
               <a:pPr/>
               <a:t>22</a:t>
-            </a:fld>
-            <a:endParaRPr lang="en-US"/>
-          </a:p>
-        </p:txBody>
-      </p:sp>
-    </p:spTree>
-    <p:extLst>
-      <p:ext uri="{BB962C8B-B14F-4D97-AF65-F5344CB8AC3E}">
-        <p14:creationId xmlns:p14="http://schemas.microsoft.com/office/powerpoint/2010/main" val="382904376"/>
-      </p:ext>
-    </p:extLst>
-  </p:cSld>
-  <p:clrMapOvr>
-    <a:masterClrMapping/>
-  </p:clrMapOvr>
-</p:sld>
-</file>
-
-<file path=ppt/slides/slide23.xml><?xml version="1.0" encoding="utf-8"?>
-<p:sld xmlns:a="http://schemas.openxmlformats.org/drawingml/2006/main" xmlns:r="http://schemas.openxmlformats.org/officeDocument/2006/relationships" xmlns:p="http://schemas.openxmlformats.org/presentationml/2006/main">
-  <p:cSld>
-    <p:spTree>
-      <p:nvGrpSpPr>
-        <p:cNvPr id="1" name=""/>
-        <p:cNvGrpSpPr/>
-        <p:nvPr/>
-      </p:nvGrpSpPr>
-      <p:grpSpPr>
-        <a:xfrm>
-          <a:off x="0" y="0"/>
-          <a:ext cx="0" cy="0"/>
-          <a:chOff x="0" y="0"/>
-          <a:chExt cx="0" cy="0"/>
-        </a:xfrm>
-      </p:grpSpPr>
-      <p:sp>
-        <p:nvSpPr>
-          <p:cNvPr id="2" name="Title 1"/>
-          <p:cNvSpPr>
-            <a:spLocks noGrp="1"/>
-          </p:cNvSpPr>
-          <p:nvPr>
-            <p:ph type="title"/>
-          </p:nvPr>
-        </p:nvSpPr>
-        <p:spPr/>
-        <p:txBody>
-          <a:bodyPr/>
-          <a:lstStyle/>
-          <a:p>
-            <a:r>
-              <a:rPr lang="en-US" dirty="0"/>
-              <a:t>Next Steps</a:t>
-            </a:r>
-          </a:p>
-        </p:txBody>
-      </p:sp>
-      <p:sp>
-        <p:nvSpPr>
-          <p:cNvPr id="3" name="Content Placeholder 2"/>
-          <p:cNvSpPr>
-            <a:spLocks noGrp="1"/>
-          </p:cNvSpPr>
-          <p:nvPr>
-            <p:ph idx="1"/>
-          </p:nvPr>
-        </p:nvSpPr>
-        <p:spPr/>
-        <p:txBody>
-          <a:bodyPr/>
-          <a:lstStyle/>
-          <a:p>
-            <a:r>
-              <a:rPr lang="en-US" dirty="0"/>
-              <a:t>Study 01-4-1-book-receipts.rkt and 01-4-2-traffic-light.rkt in the Examples folder.</a:t>
-            </a:r>
-          </a:p>
-          <a:p>
-            <a:pPr lvl="1"/>
-            <a:r>
-              <a:rPr lang="en-US" dirty="0"/>
-              <a:t>Be sure to finish the </a:t>
-            </a:r>
-            <a:r>
-              <a:rPr lang="en-US" b="1" dirty="0"/>
-              <a:t>previous-state</a:t>
-            </a:r>
-            <a:r>
-              <a:rPr lang="en-US" dirty="0"/>
-              <a:t> example in 01-4-2-traffic-light.rkt</a:t>
-            </a:r>
-          </a:p>
-          <a:p>
-            <a:r>
-              <a:rPr lang="en-US" dirty="0"/>
-              <a:t>If you have questions or comments about this lesson, post them on the discussion board.</a:t>
-            </a:r>
-          </a:p>
-          <a:p>
-            <a:r>
-              <a:rPr lang="en-US" dirty="0"/>
-              <a:t>Do the Guided Practices</a:t>
-            </a:r>
-          </a:p>
-          <a:p>
-            <a:r>
-              <a:rPr lang="en-US" dirty="0"/>
-              <a:t>Go on to the next lesson.</a:t>
-            </a:r>
-          </a:p>
-        </p:txBody>
-      </p:sp>
-      <p:sp>
-        <p:nvSpPr>
-          <p:cNvPr id="4" name="Slide Number Placeholder 3"/>
-          <p:cNvSpPr>
-            <a:spLocks noGrp="1"/>
-          </p:cNvSpPr>
-          <p:nvPr>
-            <p:ph type="sldNum" sz="quarter" idx="12"/>
-          </p:nvPr>
-        </p:nvSpPr>
-        <p:spPr/>
-        <p:txBody>
-          <a:bodyPr/>
-          <a:lstStyle/>
-          <a:p>
-            <a:fld id="{B6F15528-21DE-4FAA-801E-634DDDAF4B2B}" type="slidenum">
-              <a:rPr lang="en-US" smtClean="0"/>
-              <a:pPr/>
-              <a:t>23</a:t>
             </a:fld>
             <a:endParaRPr lang="en-US"/>
           </a:p>

</xml_diff>